<commit_message>
confirm new formats work through CI
</commit_message>
<xml_diff>
--- a/presentations/powerpoint.pptx
+++ b/presentations/powerpoint.pptx
@@ -10,6 +10,9 @@
     <p:sldId id="258" r:id="rId4"/>
     <p:sldId id="259" r:id="rId5"/>
     <p:sldId id="260" r:id="rId6"/>
+    <p:sldId id="261" r:id="rId7"/>
+    <p:sldId id="262" r:id="rId8"/>
+    <p:sldId id="263" r:id="rId9"/>
   </p:sldIdLst>
   <p:sldSz cx="9144000" cy="6858000" type="screen4x3"/>
   <p:notesSz cx="6858000" cy="9144000"/>
@@ -3140,7 +3143,15 @@
             </a:pPr>
             <a:r>
               <a:rPr/>
-              <a:t>Untitled</a:t>
+              <a:t>Example</a:t>
+            </a:r>
+            <a:r>
+              <a:rPr/>
+              <a:t> </a:t>
+            </a:r>
+            <a:r>
+              <a:rPr/>
+              <a:t>Presentation</a:t>
             </a:r>
           </a:p>
         </p:txBody>
@@ -3215,67 +3226,108 @@
             </a:pPr>
             <a:r>
               <a:rPr/>
-              <a:t>R</a:t>
-            </a:r>
+              <a:t>Overview</a:t>
+            </a:r>
+          </a:p>
+        </p:txBody>
+      </p:sp>
+      <p:sp>
+        <p:nvSpPr>
+          <p:cNvPr id="3" name="Content Placeholder 2"/>
+          <p:cNvSpPr>
+            <a:spLocks noGrp="1"/>
+          </p:cNvSpPr>
+          <p:nvPr>
+            <p:ph idx="1"/>
+          </p:nvPr>
+        </p:nvSpPr>
+        <p:spPr/>
+        <p:txBody>
+          <a:bodyPr/>
+          <a:lstStyle/>
+          <a:p>
+            <a:pPr lvl="0" marL="0" indent="0">
+              <a:buNone/>
+            </a:pPr>
             <a:r>
               <a:rPr/>
+              <a:t>This document has code embedded throughout. In the next section we will create a visualization using the already loaded dataset </a:t>
+            </a:r>
+            <a:r>
+              <a:rPr>
+                <a:latin typeface="Courier"/>
+              </a:rPr>
+              <a:t>cryptodata</a:t>
+            </a:r>
+            <a:r>
+              <a:rPr/>
+              <a:t>:</a:t>
+            </a:r>
+          </a:p>
+          <a:p>
+            <a:pPr lvl="0" indent="0">
+              <a:buNone/>
+            </a:pPr>
+            <a:r>
+              <a:rPr>
+                <a:solidFill>
+                  <a:srgbClr val="06287E"/>
+                </a:solidFill>
+                <a:latin typeface="Courier"/>
+              </a:rPr>
+              <a:t>library</a:t>
+            </a:r>
+            <a:r>
+              <a:rPr>
+                <a:latin typeface="Courier"/>
+              </a:rPr>
+              <a:t>(DT)</a:t>
+            </a:r>
+            <a:br/>
+            <a:r>
+              <a:rPr>
+                <a:solidFill>
+                  <a:srgbClr val="06287E"/>
+                </a:solidFill>
+                <a:latin typeface="Courier"/>
+              </a:rPr>
+              <a:t>datatable</a:t>
+            </a:r>
+            <a:r>
+              <a:rPr>
+                <a:latin typeface="Courier"/>
+              </a:rPr>
+              <a:t>(eth_data, </a:t>
+            </a:r>
+            <a:r>
+              <a:rPr>
+                <a:solidFill>
+                  <a:srgbClr val="7D9029"/>
+                </a:solidFill>
+                <a:latin typeface="Courier"/>
+              </a:rPr>
+              <a:t>rownames =</a:t>
+            </a:r>
+            <a:r>
+              <a:rPr>
+                <a:latin typeface="Courier"/>
+              </a:rPr>
               <a:t> </a:t>
             </a:r>
             <a:r>
-              <a:rPr/>
-              <a:t>Markdown</a:t>
-            </a:r>
-          </a:p>
-        </p:txBody>
-      </p:sp>
-      <p:sp>
-        <p:nvSpPr>
-          <p:cNvPr id="3" name="Content Placeholder 2"/>
-          <p:cNvSpPr>
-            <a:spLocks noGrp="1"/>
-          </p:cNvSpPr>
-          <p:nvPr>
-            <p:ph idx="1"/>
-          </p:nvPr>
-        </p:nvSpPr>
-        <p:spPr/>
-        <p:txBody>
-          <a:bodyPr/>
-          <a:lstStyle/>
-          <a:p>
-            <a:pPr lvl="0" marL="0" indent="0">
-              <a:buNone/>
-            </a:pPr>
-            <a:r>
-              <a:rPr/>
-              <a:t>This is an R Markdown presentation. Markdown is a simple formatting syntax for authoring HTML, PDF, and MS Word documents. For more details on using R Markdown see </a:t>
-            </a:r>
-            <a:r>
-              <a:rPr>
-                <a:hlinkClick r:id="rId2"/>
-              </a:rPr>
-              <a:t>http://rmarkdown.rstudio.com</a:t>
-            </a:r>
-            <a:r>
-              <a:rPr/>
-              <a:t>.</a:t>
-            </a:r>
-          </a:p>
-          <a:p>
-            <a:pPr lvl="0" marL="0" indent="0">
-              <a:buNone/>
-            </a:pPr>
-            <a:r>
-              <a:rPr/>
-              <a:t>When you click the </a:t>
-            </a:r>
-            <a:r>
-              <a:rPr b="1"/>
-              <a:t>Knit</a:t>
-            </a:r>
-            <a:r>
-              <a:rPr/>
-              <a:t> button a document will be generated that includes both content as well as the output of any embedded R code chunks within the document.</a:t>
+              <a:rPr>
+                <a:solidFill>
+                  <a:srgbClr val="880000"/>
+                </a:solidFill>
+                <a:latin typeface="Courier"/>
+              </a:rPr>
+              <a:t>FALSE</a:t>
+            </a:r>
+            <a:r>
+              <a:rPr>
+                <a:latin typeface="Courier"/>
+              </a:rPr>
+              <a:t>)</a:t>
             </a:r>
           </a:p>
         </p:txBody>
@@ -3302,84 +3354,36 @@
           <a:chExt cx="0" cy="0"/>
         </a:xfrm>
       </p:grpSpPr>
-      <p:sp>
-        <p:nvSpPr>
-          <p:cNvPr id="2" name="Title 1"/>
-          <p:cNvSpPr>
-            <a:spLocks noGrp="1"/>
-          </p:cNvSpPr>
-          <p:nvPr>
-            <p:ph type="title"/>
-          </p:nvPr>
-        </p:nvSpPr>
-        <p:spPr/>
-        <p:txBody>
-          <a:bodyPr/>
-          <a:lstStyle/>
-          <a:p>
-            <a:pPr lvl="0" marL="0" indent="0">
-              <a:buNone/>
-            </a:pPr>
-            <a:r>
-              <a:rPr/>
-              <a:t>Slide</a:t>
-            </a:r>
-            <a:r>
-              <a:rPr/>
-              <a:t> </a:t>
-            </a:r>
-            <a:r>
-              <a:rPr/>
-              <a:t>with</a:t>
-            </a:r>
-            <a:r>
-              <a:rPr/>
-              <a:t> </a:t>
-            </a:r>
-            <a:r>
-              <a:rPr/>
-              <a:t>Bullets</a:t>
-            </a:r>
-          </a:p>
-        </p:txBody>
-      </p:sp>
-      <p:sp>
-        <p:nvSpPr>
-          <p:cNvPr id="3" name="Content Placeholder 2"/>
-          <p:cNvSpPr>
-            <a:spLocks noGrp="1"/>
-          </p:cNvSpPr>
-          <p:nvPr>
-            <p:ph idx="1"/>
-          </p:nvPr>
-        </p:nvSpPr>
-        <p:spPr/>
-        <p:txBody>
-          <a:bodyPr/>
-          <a:lstStyle/>
-          <a:p>
-            <a:pPr lvl="1"/>
-            <a:r>
-              <a:rPr/>
-              <a:t>Bullet 1</a:t>
-            </a:r>
-          </a:p>
-          <a:p>
-            <a:pPr lvl="1"/>
-            <a:r>
-              <a:rPr/>
-              <a:t>Bullet 2</a:t>
-            </a:r>
-          </a:p>
-          <a:p>
-            <a:pPr lvl="1"/>
-            <a:r>
-              <a:rPr/>
-              <a:t>Bullet 3</a:t>
-            </a:r>
-          </a:p>
-        </p:txBody>
-      </p:sp>
+      <p:pic>
+        <p:nvPicPr>
+          <p:cNvPr descr="powerpoint_files/figure-pptx/unnamed-chunk-1-1.png" id="0" name="Picture 1"/>
+          <p:cNvPicPr>
+            <a:picLocks noGrp="1" noChangeAspect="1"/>
+          </p:cNvPicPr>
+          <p:nvPr/>
+        </p:nvPicPr>
+        <p:blipFill>
+          <a:blip r:embed="rId2"/>
+          <a:stretch>
+            <a:fillRect/>
+          </a:stretch>
+        </p:blipFill>
+        <p:spPr bwMode="auto">
+          <a:xfrm>
+            <a:off x="673100" y="1600200"/>
+            <a:ext cx="7797800" cy="4521200"/>
+          </a:xfrm>
+          <a:prstGeom prst="rect">
+            <a:avLst/>
+          </a:prstGeom>
+          <a:noFill/>
+          <a:ln w="9525">
+            <a:noFill/>
+            <a:headEnd/>
+            <a:tailEnd/>
+          </a:ln>
+        </p:spPr>
+      </p:pic>
     </p:spTree>
   </p:cSld>
 </p:sld>
@@ -3422,7 +3426,7 @@
             </a:pPr>
             <a:r>
               <a:rPr/>
-              <a:t>Slide</a:t>
+              <a:t>Price</a:t>
             </a:r>
             <a:r>
               <a:rPr/>
@@ -3430,80 +3434,41 @@
             </a:r>
             <a:r>
               <a:rPr/>
-              <a:t>with</a:t>
-            </a:r>
-            <a:r>
-              <a:rPr/>
-              <a:t> </a:t>
-            </a:r>
-            <a:r>
-              <a:rPr/>
-              <a:t>R</a:t>
-            </a:r>
-            <a:r>
-              <a:rPr/>
-              <a:t> </a:t>
-            </a:r>
-            <a:r>
-              <a:rPr/>
-              <a:t>Output</a:t>
-            </a:r>
-          </a:p>
-        </p:txBody>
-      </p:sp>
-      <p:sp>
-        <p:nvSpPr>
-          <p:cNvPr id="3" name="Content Placeholder 2"/>
-          <p:cNvSpPr>
-            <a:spLocks noGrp="1"/>
-          </p:cNvSpPr>
-          <p:nvPr>
-            <p:ph idx="1"/>
-          </p:nvPr>
-        </p:nvSpPr>
-        <p:spPr/>
-        <p:txBody>
-          <a:bodyPr/>
-          <a:lstStyle/>
-          <a:p>
-            <a:pPr lvl="0" indent="0">
-              <a:buNone/>
-            </a:pPr>
-            <a:r>
-              <a:rPr b="1">
-                <a:solidFill>
-                  <a:srgbClr val="007020"/>
-                </a:solidFill>
-                <a:latin typeface="Courier"/>
-              </a:rPr>
-              <a:t>summary</a:t>
-            </a:r>
-            <a:r>
-              <a:rPr>
-                <a:latin typeface="Courier"/>
-              </a:rPr>
-              <a:t>(cars)</a:t>
-            </a:r>
-          </a:p>
-          <a:p>
-            <a:pPr lvl="0" indent="0">
-              <a:buNone/>
-            </a:pPr>
-            <a:r>
-              <a:rPr>
-                <a:latin typeface="Courier"/>
-              </a:rPr>
-              <a:t>##      speed           dist       
-##  Min.   : 4.0   Min.   :  2.00  
-##  1st Qu.:12.0   1st Qu.: 26.00  
-##  Median :15.0   Median : 36.00  
-##  Mean   :15.4   Mean   : 42.98  
-##  3rd Qu.:19.0   3rd Qu.: 56.00  
-##  Max.   :25.0   Max.   :120.00</a:t>
-            </a:r>
-          </a:p>
-        </p:txBody>
-      </p:sp>
+              <a:t>Chart</a:t>
+            </a:r>
+          </a:p>
+        </p:txBody>
+      </p:sp>
+      <p:pic>
+        <p:nvPicPr>
+          <p:cNvPr descr="powerpoint_files/figure-pptx/unnamed-chunk-2-1.png" id="0" name="Picture 1"/>
+          <p:cNvPicPr>
+            <a:picLocks noGrp="1" noChangeAspect="1"/>
+          </p:cNvPicPr>
+          <p:nvPr/>
+        </p:nvPicPr>
+        <p:blipFill>
+          <a:blip r:embed="rId2"/>
+          <a:stretch>
+            <a:fillRect/>
+          </a:stretch>
+        </p:blipFill>
+        <p:spPr bwMode="auto">
+          <a:xfrm>
+            <a:off x="1752600" y="1600200"/>
+            <a:ext cx="5651500" cy="4521200"/>
+          </a:xfrm>
+          <a:prstGeom prst="rect">
+            <a:avLst/>
+          </a:prstGeom>
+          <a:noFill/>
+          <a:ln w="9525">
+            <a:noFill/>
+            <a:headEnd/>
+            <a:tailEnd/>
+          </a:ln>
+        </p:spPr>
+      </p:pic>
     </p:spTree>
   </p:cSld>
 </p:sld>
@@ -3546,7 +3511,7 @@
             </a:pPr>
             <a:r>
               <a:rPr/>
-              <a:t>Slide</a:t>
+              <a:t>Python</a:t>
             </a:r>
             <a:r>
               <a:rPr/>
@@ -3554,7 +3519,7 @@
             </a:r>
             <a:r>
               <a:rPr/>
-              <a:t>with</a:t>
+              <a:t>Code</a:t>
             </a:r>
             <a:r>
               <a:rPr/>
@@ -3562,14 +3527,641 @@
             </a:r>
             <a:r>
               <a:rPr/>
-              <a:t>Plot</a:t>
-            </a:r>
-          </a:p>
-        </p:txBody>
-      </p:sp>
+              <a:t>Example</a:t>
+            </a:r>
+          </a:p>
+        </p:txBody>
+      </p:sp>
+      <p:sp>
+        <p:nvSpPr>
+          <p:cNvPr id="3" name="Content Placeholder 2"/>
+          <p:cNvSpPr>
+            <a:spLocks noGrp="1"/>
+          </p:cNvSpPr>
+          <p:nvPr>
+            <p:ph idx="1"/>
+          </p:nvPr>
+        </p:nvSpPr>
+        <p:spPr/>
+        <p:txBody>
+          <a:bodyPr/>
+          <a:lstStyle/>
+          <a:p>
+            <a:pPr lvl="0" indent="0">
+              <a:buNone/>
+            </a:pPr>
+            <a:r>
+              <a:rPr>
+                <a:latin typeface="Courier"/>
+              </a:rPr>
+              <a:t>import pandas as pd</a:t>
+            </a:r>
+            <a:br/>
+            <a:r>
+              <a:rPr i="1">
+                <a:solidFill>
+                  <a:srgbClr val="60A0B0"/>
+                </a:solidFill>
+                <a:latin typeface="Courier"/>
+              </a:rPr>
+              <a:t># Create the Python object from R</a:t>
+            </a:r>
+            <a:br/>
+            <a:r>
+              <a:rPr>
+                <a:latin typeface="Courier"/>
+              </a:rPr>
+              <a:t>df </a:t>
+            </a:r>
+            <a:r>
+              <a:rPr>
+                <a:solidFill>
+                  <a:srgbClr val="666666"/>
+                </a:solidFill>
+                <a:latin typeface="Courier"/>
+              </a:rPr>
+              <a:t>=</a:t>
+            </a:r>
+            <a:r>
+              <a:rPr>
+                <a:latin typeface="Courier"/>
+              </a:rPr>
+              <a:t> r.cryptodata</a:t>
+            </a:r>
+            <a:br/>
+            <a:r>
+              <a:rPr i="1">
+                <a:solidFill>
+                  <a:srgbClr val="60A0B0"/>
+                </a:solidFill>
+                <a:latin typeface="Courier"/>
+              </a:rPr>
+              <a:t># Show the new Python dataframe</a:t>
+            </a:r>
+            <a:br/>
+            <a:r>
+              <a:rPr>
+                <a:latin typeface="Courier"/>
+              </a:rPr>
+              <a:t>df</a:t>
+            </a:r>
+          </a:p>
+          <a:p>
+            <a:pPr lvl="0" indent="0">
+              <a:buNone/>
+            </a:pPr>
+            <a:r>
+              <a:rPr>
+                <a:latin typeface="Courier"/>
+              </a:rPr>
+              <a:t>##         pair symbol  ask_1_price       date_time_utc
+## 0     BTCUSD    BTC    18037.560 2020-12-12 00:00:00
+## 1     ETHUSD    ETH      544.422 2020-12-12 00:00:01
+## 2     BTCUSD    BTC    18338.710 2020-12-12 01:00:00
+## 3     ETHUSD    ETH      555.184 2020-12-12 01:00:01
+## 4     BTCUSD    BTC    18283.790 2020-12-12 02:00:00
+## ...      ...    ...          ...                 ...
+## 5075  BTCUSD    BTC    11847.080 2020-08-10 21:03:49
+## 5076  BTCUSD    BTC    11819.920 2020-08-10 22:03:49
+## 5077  BTCUSD    BTC    11804.900 2020-08-10 23:03:54
+## 5078  BTCUSD    BTC    10686.880                 NaT
+## 5079  ETHUSD    ETH      357.844                 NaT
+## 
+## [5080 rows x 4 columns]</a:t>
+            </a:r>
+          </a:p>
+        </p:txBody>
+      </p:sp>
+    </p:spTree>
+  </p:cSld>
+</p:sld>
+</file>
+
+<file path=ppt/slides/slide6.xml><?xml version="1.0" encoding="utf-8"?>
+<p:sld xmlns:a="http://schemas.openxmlformats.org/drawingml/2006/main" xmlns:r="http://schemas.openxmlformats.org/officeDocument/2006/relationships" xmlns:p="http://schemas.openxmlformats.org/presentationml/2006/main">
+  <p:cSld>
+    <p:spTree>
+      <p:nvGrpSpPr>
+        <p:cNvPr id="1" name=""/>
+        <p:cNvGrpSpPr/>
+        <p:nvPr/>
+      </p:nvGrpSpPr>
+      <p:grpSpPr>
+        <a:xfrm>
+          <a:off x="0" y="0"/>
+          <a:ext cx="0" cy="0"/>
+          <a:chOff x="0" y="0"/>
+          <a:chExt cx="0" cy="0"/>
+        </a:xfrm>
+      </p:grpSpPr>
+      <p:sp>
+        <p:nvSpPr>
+          <p:cNvPr id="2" name="Title 1"/>
+          <p:cNvSpPr>
+            <a:spLocks noGrp="1"/>
+          </p:cNvSpPr>
+          <p:nvPr>
+            <p:ph type="title"/>
+          </p:nvPr>
+        </p:nvSpPr>
+        <p:spPr/>
+        <p:txBody>
+          <a:bodyPr/>
+          <a:lstStyle/>
+          <a:p>
+            <a:pPr lvl="0" marL="0" indent="0">
+              <a:buNone/>
+            </a:pPr>
+            <a:r>
+              <a:rPr/>
+              <a:t>One</a:t>
+            </a:r>
+            <a:r>
+              <a:rPr/>
+              <a:t> </a:t>
+            </a:r>
+            <a:r>
+              <a:rPr/>
+              <a:t>more</a:t>
+            </a:r>
+            <a:r>
+              <a:rPr/>
+              <a:t> </a:t>
+            </a:r>
+            <a:r>
+              <a:rPr/>
+              <a:t>Python</a:t>
+            </a:r>
+            <a:r>
+              <a:rPr/>
+              <a:t> </a:t>
+            </a:r>
+            <a:r>
+              <a:rPr/>
+              <a:t>example</a:t>
+            </a:r>
+          </a:p>
+        </p:txBody>
+      </p:sp>
+      <p:sp>
+        <p:nvSpPr>
+          <p:cNvPr id="3" name="Content Placeholder 2"/>
+          <p:cNvSpPr>
+            <a:spLocks noGrp="1"/>
+          </p:cNvSpPr>
+          <p:nvPr>
+            <p:ph idx="1"/>
+          </p:nvPr>
+        </p:nvSpPr>
+        <p:spPr/>
+        <p:txBody>
+          <a:bodyPr/>
+          <a:lstStyle/>
+          <a:p>
+            <a:pPr lvl="0" marL="0" indent="0">
+              <a:buNone/>
+            </a:pPr>
+            <a:r>
+              <a:rPr/>
+              <a:t>Press on </a:t>
+            </a:r>
+            <a:r>
+              <a:rPr>
+                <a:latin typeface="Courier"/>
+              </a:rPr>
+              <a:t>w</a:t>
+            </a:r>
+            <a:r>
+              <a:rPr/>
+              <a:t> on your keyboard to make the presentation wider. Press </a:t>
+            </a:r>
+            <a:r>
+              <a:rPr>
+                <a:latin typeface="Courier"/>
+              </a:rPr>
+              <a:t>f</a:t>
+            </a:r>
+            <a:r>
+              <a:rPr/>
+              <a:t> to fullscreen.</a:t>
+            </a:r>
+          </a:p>
+          <a:p>
+            <a:pPr lvl="0" indent="0">
+              <a:buNone/>
+            </a:pPr>
+            <a:r>
+              <a:rPr>
+                <a:latin typeface="Courier"/>
+              </a:rPr>
+              <a:t>import numpy as np</a:t>
+            </a:r>
+            <a:br/>
+            <a:r>
+              <a:rPr i="1">
+                <a:solidFill>
+                  <a:srgbClr val="60A0B0"/>
+                </a:solidFill>
+                <a:latin typeface="Courier"/>
+              </a:rPr>
+              <a:t># Create a new field based on the ask_1_price value:</a:t>
+            </a:r>
+            <a:br/>
+            <a:r>
+              <a:rPr>
+                <a:latin typeface="Courier"/>
+              </a:rPr>
+              <a:t>df[</a:t>
+            </a:r>
+            <a:r>
+              <a:rPr>
+                <a:solidFill>
+                  <a:srgbClr val="4070A0"/>
+                </a:solidFill>
+                <a:latin typeface="Courier"/>
+              </a:rPr>
+              <a:t>'price_percentile'</a:t>
+            </a:r>
+            <a:r>
+              <a:rPr>
+                <a:latin typeface="Courier"/>
+              </a:rPr>
+              <a:t>] </a:t>
+            </a:r>
+            <a:r>
+              <a:rPr>
+                <a:solidFill>
+                  <a:srgbClr val="666666"/>
+                </a:solidFill>
+                <a:latin typeface="Courier"/>
+              </a:rPr>
+              <a:t>=</a:t>
+            </a:r>
+            <a:r>
+              <a:rPr>
+                <a:latin typeface="Courier"/>
+              </a:rPr>
+              <a:t> np.where(df[</a:t>
+            </a:r>
+            <a:r>
+              <a:rPr>
+                <a:solidFill>
+                  <a:srgbClr val="4070A0"/>
+                </a:solidFill>
+                <a:latin typeface="Courier"/>
+              </a:rPr>
+              <a:t>'ask_1_price'</a:t>
+            </a:r>
+            <a:r>
+              <a:rPr>
+                <a:latin typeface="Courier"/>
+              </a:rPr>
+              <a:t>] </a:t>
+            </a:r>
+            <a:r>
+              <a:rPr>
+                <a:solidFill>
+                  <a:srgbClr val="666666"/>
+                </a:solidFill>
+                <a:latin typeface="Courier"/>
+              </a:rPr>
+              <a:t>&gt;</a:t>
+            </a:r>
+            <a:r>
+              <a:rPr>
+                <a:latin typeface="Courier"/>
+              </a:rPr>
+              <a:t> np.percentile(df[</a:t>
+            </a:r>
+            <a:r>
+              <a:rPr>
+                <a:solidFill>
+                  <a:srgbClr val="4070A0"/>
+                </a:solidFill>
+                <a:latin typeface="Courier"/>
+              </a:rPr>
+              <a:t>'ask_1_price'</a:t>
+            </a:r>
+            <a:r>
+              <a:rPr>
+                <a:latin typeface="Courier"/>
+              </a:rPr>
+              <a:t>], </a:t>
+            </a:r>
+            <a:r>
+              <a:rPr>
+                <a:solidFill>
+                  <a:srgbClr val="40A070"/>
+                </a:solidFill>
+                <a:latin typeface="Courier"/>
+              </a:rPr>
+              <a:t>50</a:t>
+            </a:r>
+            <a:r>
+              <a:rPr>
+                <a:latin typeface="Courier"/>
+              </a:rPr>
+              <a:t>),</a:t>
+            </a:r>
+            <a:br/>
+            <a:r>
+              <a:rPr>
+                <a:latin typeface="Courier"/>
+              </a:rPr>
+              <a:t>                            </a:t>
+            </a:r>
+            <a:r>
+              <a:rPr>
+                <a:solidFill>
+                  <a:srgbClr val="4070A0"/>
+                </a:solidFill>
+                <a:latin typeface="Courier"/>
+              </a:rPr>
+              <a:t>'upper 50th percentile of prices'</a:t>
+            </a:r>
+            <a:r>
+              <a:rPr>
+                <a:latin typeface="Courier"/>
+              </a:rPr>
+              <a:t>, </a:t>
+            </a:r>
+            <a:br/>
+            <a:r>
+              <a:rPr>
+                <a:latin typeface="Courier"/>
+              </a:rPr>
+              <a:t>                            </a:t>
+            </a:r>
+            <a:r>
+              <a:rPr>
+                <a:solidFill>
+                  <a:srgbClr val="4070A0"/>
+                </a:solidFill>
+                <a:latin typeface="Courier"/>
+              </a:rPr>
+              <a:t>'lower 50th percentile of prices'</a:t>
+            </a:r>
+            <a:r>
+              <a:rPr>
+                <a:latin typeface="Courier"/>
+              </a:rPr>
+              <a:t>)</a:t>
+            </a:r>
+            <a:br/>
+            <a:r>
+              <a:rPr i="1">
+                <a:solidFill>
+                  <a:srgbClr val="60A0B0"/>
+                </a:solidFill>
+                <a:latin typeface="Courier"/>
+              </a:rPr>
+              <a:t># Show modified dataframe:</a:t>
+            </a:r>
+            <a:br/>
+            <a:r>
+              <a:rPr>
+                <a:latin typeface="Courier"/>
+              </a:rPr>
+              <a:t>df[[</a:t>
+            </a:r>
+            <a:r>
+              <a:rPr>
+                <a:solidFill>
+                  <a:srgbClr val="4070A0"/>
+                </a:solidFill>
+                <a:latin typeface="Courier"/>
+              </a:rPr>
+              <a:t>'symbol'</a:t>
+            </a:r>
+            <a:r>
+              <a:rPr>
+                <a:latin typeface="Courier"/>
+              </a:rPr>
+              <a:t>, </a:t>
+            </a:r>
+            <a:r>
+              <a:rPr>
+                <a:solidFill>
+                  <a:srgbClr val="4070A0"/>
+                </a:solidFill>
+                <a:latin typeface="Courier"/>
+              </a:rPr>
+              <a:t>'ask_1_price'</a:t>
+            </a:r>
+            <a:r>
+              <a:rPr>
+                <a:latin typeface="Courier"/>
+              </a:rPr>
+              <a:t>, </a:t>
+            </a:r>
+            <a:r>
+              <a:rPr>
+                <a:solidFill>
+                  <a:srgbClr val="4070A0"/>
+                </a:solidFill>
+                <a:latin typeface="Courier"/>
+              </a:rPr>
+              <a:t>'price_percentile'</a:t>
+            </a:r>
+            <a:r>
+              <a:rPr>
+                <a:latin typeface="Courier"/>
+              </a:rPr>
+              <a:t>]]</a:t>
+            </a:r>
+          </a:p>
+          <a:p>
+            <a:pPr lvl="0" indent="0">
+              <a:buNone/>
+            </a:pPr>
+            <a:r>
+              <a:rPr>
+                <a:latin typeface="Courier"/>
+              </a:rPr>
+              <a:t>##      symbol  ask_1_price                 price_percentile
+## 0       BTC    18037.560  upper 50th percentile of prices
+## 1       ETH      544.422  lower 50th percentile of prices
+## 2       BTC    18338.710  upper 50th percentile of prices
+## 3       ETH      555.184  lower 50th percentile of prices
+## 4       BTC    18283.790  upper 50th percentile of prices
+## ...     ...          ...                              ...
+## 5075    BTC    11847.080  upper 50th percentile of prices
+## 5076    BTC    11819.920  upper 50th percentile of prices
+## 5077    BTC    11804.900  upper 50th percentile of prices
+## 5078    BTC    10686.880  upper 50th percentile of prices
+## 5079    ETH      357.844  lower 50th percentile of prices
+## 
+## [5080 rows x 3 columns]</a:t>
+            </a:r>
+          </a:p>
+        </p:txBody>
+      </p:sp>
+    </p:spTree>
+  </p:cSld>
+</p:sld>
+</file>
+
+<file path=ppt/slides/slide7.xml><?xml version="1.0" encoding="utf-8"?>
+<p:sld xmlns:a="http://schemas.openxmlformats.org/drawingml/2006/main" xmlns:r="http://schemas.openxmlformats.org/officeDocument/2006/relationships" xmlns:p="http://schemas.openxmlformats.org/presentationml/2006/main">
+  <p:cSld>
+    <p:spTree>
+      <p:nvGrpSpPr>
+        <p:cNvPr id="1" name=""/>
+        <p:cNvGrpSpPr/>
+        <p:nvPr/>
+      </p:nvGrpSpPr>
+      <p:grpSpPr>
+        <a:xfrm>
+          <a:off x="0" y="0"/>
+          <a:ext cx="0" cy="0"/>
+          <a:chOff x="0" y="0"/>
+          <a:chExt cx="0" cy="0"/>
+        </a:xfrm>
+      </p:grpSpPr>
+      <p:sp>
+        <p:nvSpPr>
+          <p:cNvPr id="2" name="Title 1"/>
+          <p:cNvSpPr>
+            <a:spLocks noGrp="1"/>
+          </p:cNvSpPr>
+          <p:nvPr>
+            <p:ph type="title"/>
+          </p:nvPr>
+        </p:nvSpPr>
+        <p:spPr/>
+        <p:txBody>
+          <a:bodyPr/>
+          <a:lstStyle/>
+          <a:p>
+            <a:pPr lvl="0" marL="0" indent="0">
+              <a:buNone/>
+            </a:pPr>
+            <a:r>
+              <a:rPr>
+                <a:hlinkClick r:id="rId2"/>
+              </a:rPr>
+              <a:t>Back</a:t>
+            </a:r>
+            <a:r>
+              <a:rPr>
+                <a:hlinkClick r:id="rId3"/>
+              </a:rPr>
+              <a:t> </a:t>
+            </a:r>
+            <a:r>
+              <a:rPr>
+                <a:hlinkClick r:id="rId4"/>
+              </a:rPr>
+              <a:t>to</a:t>
+            </a:r>
+            <a:r>
+              <a:rPr>
+                <a:hlinkClick r:id="rId5"/>
+              </a:rPr>
+              <a:t> </a:t>
+            </a:r>
+            <a:r>
+              <a:rPr>
+                <a:hlinkClick r:id="rId6"/>
+              </a:rPr>
+              <a:t>Gallery</a:t>
+            </a:r>
+          </a:p>
+        </p:txBody>
+      </p:sp>
+      <p:sp>
+        <p:nvSpPr>
+          <p:cNvPr id="3" name="Content Placeholder 2"/>
+          <p:cNvSpPr>
+            <a:spLocks noGrp="1"/>
+          </p:cNvSpPr>
+          <p:nvPr>
+            <p:ph idx="1"/>
+          </p:nvPr>
+        </p:nvSpPr>
+        <p:spPr/>
+        <p:txBody>
+          <a:bodyPr/>
+          <a:lstStyle/>
+          <a:p>
+            <a:pPr lvl="0" indent="0">
+              <a:buNone/>
+            </a:pPr>
+            <a:r>
+              <a:rPr>
+                <a:latin typeface="Courier"/>
+              </a:rPr>
+              <a:t>knitr</a:t>
+            </a:r>
+            <a:r>
+              <a:rPr>
+                <a:solidFill>
+                  <a:srgbClr val="4070A0"/>
+                </a:solidFill>
+                <a:latin typeface="Courier"/>
+              </a:rPr>
+              <a:t>::</a:t>
+            </a:r>
+            <a:r>
+              <a:rPr>
+                <a:solidFill>
+                  <a:srgbClr val="06287E"/>
+                </a:solidFill>
+                <a:latin typeface="Courier"/>
+              </a:rPr>
+              <a:t>include_url</a:t>
+            </a:r>
+            <a:r>
+              <a:rPr>
+                <a:latin typeface="Courier"/>
+              </a:rPr>
+              <a:t>(</a:t>
+            </a:r>
+            <a:r>
+              <a:rPr>
+                <a:solidFill>
+                  <a:srgbClr val="4070A0"/>
+                </a:solidFill>
+                <a:latin typeface="Courier"/>
+              </a:rPr>
+              <a:t>"https://r-markdown-gallery.org"</a:t>
+            </a:r>
+            <a:r>
+              <a:rPr>
+                <a:latin typeface="Courier"/>
+              </a:rPr>
+              <a:t>)</a:t>
+            </a:r>
+          </a:p>
+        </p:txBody>
+      </p:sp>
+    </p:spTree>
+  </p:cSld>
+</p:sld>
+</file>
+
+<file path=ppt/slides/slide8.xml><?xml version="1.0" encoding="utf-8"?>
+<p:sld xmlns:a="http://schemas.openxmlformats.org/drawingml/2006/main" xmlns:r="http://schemas.openxmlformats.org/officeDocument/2006/relationships" xmlns:p="http://schemas.openxmlformats.org/presentationml/2006/main">
+  <p:cSld>
+    <p:spTree>
+      <p:nvGrpSpPr>
+        <p:cNvPr id="1" name=""/>
+        <p:cNvGrpSpPr/>
+        <p:nvPr/>
+      </p:nvGrpSpPr>
+      <p:grpSpPr>
+        <a:xfrm>
+          <a:off x="0" y="0"/>
+          <a:ext cx="0" cy="0"/>
+          <a:chOff x="0" y="0"/>
+          <a:chExt cx="0" cy="0"/>
+        </a:xfrm>
+      </p:grpSpPr>
       <p:pic>
         <p:nvPicPr>
-          <p:cNvPr descr="powerpoint_files/figure-pptx/pressure-1.png" id="0" name="Picture 1"/>
+          <p:cNvPr descr="powerpoint_files/figure-pptx/unnamed-chunk-5-1.png" id="0" name="Picture 1">
+            <a:hlinkClick r:id="rId3"/>
+          </p:cNvPr>
           <p:cNvPicPr>
             <a:picLocks noGrp="1" noChangeAspect="1"/>
           </p:cNvPicPr>

</xml_diff>

<commit_message>
update powerpoint and add beamer
</commit_message>
<xml_diff>
--- a/presentations/powerpoint.pptx
+++ b/presentations/powerpoint.pptx
@@ -3257,7 +3257,7 @@
               <a:rPr>
                 <a:latin typeface="Courier"/>
               </a:rPr>
-              <a:t>cryptodata</a:t>
+              <a:t>eth_data</a:t>
             </a:r>
             <a:r>
               <a:rPr/>
@@ -3275,59 +3275,13 @@
                 </a:solidFill>
                 <a:latin typeface="Courier"/>
               </a:rPr>
-              <a:t>library</a:t>
-            </a:r>
-            <a:r>
-              <a:rPr>
-                <a:latin typeface="Courier"/>
-              </a:rPr>
-              <a:t>(DT)</a:t>
-            </a:r>
-            <a:br/>
-            <a:r>
-              <a:rPr>
-                <a:solidFill>
-                  <a:srgbClr val="06287E"/>
-                </a:solidFill>
-                <a:latin typeface="Courier"/>
-              </a:rPr>
               <a:t>datatable</a:t>
             </a:r>
             <a:r>
               <a:rPr>
                 <a:latin typeface="Courier"/>
               </a:rPr>
-              <a:t>(eth_data, </a:t>
-            </a:r>
-            <a:r>
-              <a:rPr>
-                <a:solidFill>
-                  <a:srgbClr val="7D9029"/>
-                </a:solidFill>
-                <a:latin typeface="Courier"/>
-              </a:rPr>
-              <a:t>rownames =</a:t>
-            </a:r>
-            <a:r>
-              <a:rPr>
-                <a:latin typeface="Courier"/>
-              </a:rPr>
-              <a:t> </a:t>
-            </a:r>
-            <a:r>
-              <a:rPr>
-                <a:solidFill>
-                  <a:srgbClr val="880000"/>
-                </a:solidFill>
-                <a:latin typeface="Courier"/>
-              </a:rPr>
-              <a:t>FALSE</a:t>
-            </a:r>
-            <a:r>
-              <a:rPr>
-                <a:latin typeface="Courier"/>
-              </a:rPr>
-              <a:t>)</a:t>
+              <a:t>(eth_data)</a:t>
             </a:r>
           </a:p>
         </p:txBody>
@@ -3615,19 +3569,19 @@
                 <a:latin typeface="Courier"/>
               </a:rPr>
               <a:t>##         pair symbol  ask_1_price       date_time_utc
-## 0     BTCUSD    BTC    18037.560 2020-12-12 00:00:00
-## 1     ETHUSD    ETH      544.422 2020-12-12 00:00:01
-## 2     BTCUSD    BTC    18338.710 2020-12-12 01:00:00
-## 3     ETHUSD    ETH      555.184 2020-12-12 01:00:01
-## 4     BTCUSD    BTC    18283.790 2020-12-12 02:00:00
+## 0     BTCUSD    BTC    18371.130 2020-12-12 15:00:01
+## 1     ETHUSD    ETH      553.770 2020-12-12 15:00:01
+## 2     ETHUSD    ETH      555.539 2020-12-12 14:00:01
+## 3     BTCUSD    BTC    18400.890 2020-12-12 14:00:00
+## 4     ETHUSD    ETH      557.140 2020-12-12 13:00:01
 ## ...      ...    ...          ...                 ...
-## 5077  BTCUSD    BTC    11847.080 2020-08-10 21:03:49
-## 5078  BTCUSD    BTC    11819.920 2020-08-10 22:03:49
-## 5079  BTCUSD    BTC    11804.900 2020-08-10 23:03:54
-## 5080  BTCUSD    BTC    10686.880                 NaT
-## 5081  ETHUSD    ETH      357.844                 NaT
+## 5091  BTCUSD    BTC    11972.900 2020-08-10 06:03:50
+## 5092  BTCUSD    BTC    11985.890 2020-08-10 05:03:48
+## 5093  BTCUSD    BTC    11997.470 2020-08-10 04:32:55
+## 5094  BTCUSD    BTC    10686.880                 NaT
+## 5095  ETHUSD    ETH      357.844                 NaT
 ## 
-## [5082 rows x 4 columns]</a:t>
+## [5096 rows x 4 columns]</a:t>
             </a:r>
           </a:p>
         </p:txBody>
@@ -3831,7 +3785,14 @@
               <a:rPr>
                 <a:latin typeface="Courier"/>
               </a:rPr>
-              <a:t> np.percentile(df[</a:t>
+              <a:t> </a:t>
+            </a:r>
+            <a:br/>
+            <a:r>
+              <a:rPr>
+                <a:latin typeface="Courier"/>
+              </a:rPr>
+              <a:t>                                  np.percentile(df[</a:t>
             </a:r>
             <a:r>
               <a:rPr>
@@ -3979,19 +3940,19 @@
                 <a:latin typeface="Courier"/>
               </a:rPr>
               <a:t>##      symbol  ask_1_price                 price_percentile
-## 0       BTC    18037.560  upper 50th percentile of prices
-## 1       ETH      544.422  lower 50th percentile of prices
-## 2       BTC    18338.710  upper 50th percentile of prices
-## 3       ETH      555.184  lower 50th percentile of prices
-## 4       BTC    18283.790  upper 50th percentile of prices
+## 0       BTC    18371.130  upper 50th percentile of prices
+## 1       ETH      553.770  lower 50th percentile of prices
+## 2       ETH      555.539  lower 50th percentile of prices
+## 3       BTC    18400.890  upper 50th percentile of prices
+## 4       ETH      557.140  lower 50th percentile of prices
 ## ...     ...          ...                              ...
-## 5077    BTC    11847.080  upper 50th percentile of prices
-## 5078    BTC    11819.920  upper 50th percentile of prices
-## 5079    BTC    11804.900  upper 50th percentile of prices
-## 5080    BTC    10686.880  upper 50th percentile of prices
-## 5081    ETH      357.844  lower 50th percentile of prices
+## 5091    BTC    11972.900  upper 50th percentile of prices
+## 5092    BTC    11985.890  upper 50th percentile of prices
+## 5093    BTC    11997.470  upper 50th percentile of prices
+## 5094    BTC    10686.880  upper 50th percentile of prices
+## 5095    ETH      357.844  lower 50th percentile of prices
 ## 
-## [5082 rows x 3 columns]</a:t>
+## [5096 rows x 3 columns]</a:t>
             </a:r>
           </a:p>
         </p:txBody>

</xml_diff>

<commit_message>
update website and gh script
</commit_message>
<xml_diff>
--- a/presentations/powerpoint.pptx
+++ b/presentations/powerpoint.pptx
@@ -3185,8 +3185,77 @@
             <a:pPr lvl="0" marL="0" indent="0">
               <a:buNone/>
             </a:pPr>
+            <a:r>
+              <a:rPr/>
+              <a:t>Last</a:t>
+            </a:r>
+            <a:r>
+              <a:rPr/>
+              <a:t> </a:t>
+            </a:r>
+            <a:r>
+              <a:rPr/>
+              <a:t>run</a:t>
+            </a:r>
+            <a:r>
+              <a:rPr/>
+              <a:t> </a:t>
+            </a:r>
+            <a:r>
+              <a:rPr/>
+              <a:t>on:</a:t>
+            </a:r>
+            <a:r>
+              <a:rPr/>
+              <a:t> </a:t>
+            </a:r>
+            <a:r>
+              <a:rPr/>
+              <a:t>2020-12-15</a:t>
+            </a:r>
+            <a:r>
+              <a:rPr/>
+              <a:t> </a:t>
+            </a:r>
+            <a:r>
+              <a:rPr/>
+              <a:t>10:06:25</a:t>
+            </a:r>
             <a:br/>
             <a:br/>
+          </a:p>
+        </p:txBody>
+      </p:sp>
+      <p:sp>
+        <p:nvSpPr>
+          <p:cNvPr id="4" name="Date Placeholder 3"/>
+          <p:cNvSpPr>
+            <a:spLocks noGrp="1"/>
+          </p:cNvSpPr>
+          <p:nvPr>
+            <p:ph type="dt" sz="half" idx="10"/>
+          </p:nvPr>
+        </p:nvSpPr>
+        <p:spPr/>
+        <p:txBody>
+          <a:bodyPr/>
+          <a:lstStyle/>
+          <a:p>
+            <a:pPr lvl="0" marL="0" indent="0">
+              <a:buNone/>
+            </a:pPr>
+            <a:r>
+              <a:rPr/>
+              <a:t>2020-12-15</a:t>
+            </a:r>
+            <a:r>
+              <a:rPr/>
+              <a:t> </a:t>
+            </a:r>
+            <a:r>
+              <a:rPr/>
+              <a:t>10:06:25</a:t>
+            </a:r>
           </a:p>
         </p:txBody>
       </p:sp>
@@ -3260,7 +3329,7 @@
               <a:t>This document has code embedded throughout. In the next section we will create a visualization using the already loaded dataset </a:t>
             </a:r>
             <a:r>
-              <a:rPr sz="1800">
+              <a:rPr>
                 <a:latin typeface="Courier"/>
               </a:rPr>
               <a:t>eth_data</a:t>
@@ -3271,20 +3340,20 @@
             </a:r>
           </a:p>
           <a:p>
-            <a:pPr lvl="0" marL="1270000" indent="0">
+            <a:pPr lvl="0" indent="0">
               <a:buNone/>
             </a:pPr>
             <a:r>
-              <a:rPr sz="1800" b="1">
+              <a:rPr>
                 <a:solidFill>
-                  <a:srgbClr val="007020"/>
+                  <a:srgbClr val="06287E"/>
                 </a:solidFill>
                 <a:latin typeface="Courier"/>
               </a:rPr>
               <a:t>datatable</a:t>
             </a:r>
             <a:r>
-              <a:rPr sz="1800">
+              <a:rPr>
                 <a:latin typeface="Courier"/>
               </a:rPr>
               <a:t>(eth_data)</a:t>
@@ -3298,6 +3367,58 @@
 </file>
 
 <file path=ppt/slides/slide3.xml><?xml version="1.0" encoding="utf-8"?>
+<p:sld xmlns:a="http://schemas.openxmlformats.org/drawingml/2006/main" xmlns:r="http://schemas.openxmlformats.org/officeDocument/2006/relationships" xmlns:p="http://schemas.openxmlformats.org/presentationml/2006/main">
+  <p:cSld>
+    <p:spTree>
+      <p:nvGrpSpPr>
+        <p:cNvPr id="1" name=""/>
+        <p:cNvGrpSpPr/>
+        <p:nvPr/>
+      </p:nvGrpSpPr>
+      <p:grpSpPr>
+        <a:xfrm>
+          <a:off x="0" y="0"/>
+          <a:ext cx="0" cy="0"/>
+          <a:chOff x="0" y="0"/>
+          <a:chExt cx="0" cy="0"/>
+        </a:xfrm>
+      </p:grpSpPr>
+      <p:pic>
+        <p:nvPicPr>
+          <p:cNvPr descr="powerpoint_files/figure-pptx/unnamed-chunk-1-1.png" id="0" name="Picture 1"/>
+          <p:cNvPicPr>
+            <a:picLocks noGrp="1" noChangeAspect="1"/>
+          </p:cNvPicPr>
+          <p:nvPr/>
+        </p:nvPicPr>
+        <p:blipFill>
+          <a:blip r:embed="rId2"/>
+          <a:stretch>
+            <a:fillRect/>
+          </a:stretch>
+        </p:blipFill>
+        <p:spPr bwMode="auto">
+          <a:xfrm>
+            <a:off x="673100" y="1600200"/>
+            <a:ext cx="7797800" cy="4521200"/>
+          </a:xfrm>
+          <a:prstGeom prst="rect">
+            <a:avLst/>
+          </a:prstGeom>
+          <a:noFill/>
+          <a:ln w="9525">
+            <a:noFill/>
+            <a:headEnd/>
+            <a:tailEnd/>
+          </a:ln>
+        </p:spPr>
+      </p:pic>
+    </p:spTree>
+  </p:cSld>
+</p:sld>
+</file>
+
+<file path=ppt/slides/slide4.xml><?xml version="1.0" encoding="utf-8"?>
 <p:sld xmlns:a="http://schemas.openxmlformats.org/drawingml/2006/main" xmlns:r="http://schemas.openxmlformats.org/officeDocument/2006/relationships" xmlns:p="http://schemas.openxmlformats.org/presentationml/2006/main">
   <p:cSld>
     <p:spTree>
@@ -3398,169 +3519,6 @@
 </p:sld>
 </file>
 
-<file path=ppt/slides/slide4.xml><?xml version="1.0" encoding="utf-8"?>
-<p:sld xmlns:a="http://schemas.openxmlformats.org/drawingml/2006/main" xmlns:r="http://schemas.openxmlformats.org/officeDocument/2006/relationships" xmlns:p="http://schemas.openxmlformats.org/presentationml/2006/main">
-  <p:cSld>
-    <p:spTree>
-      <p:nvGrpSpPr>
-        <p:cNvPr id="1" name=""/>
-        <p:cNvGrpSpPr/>
-        <p:nvPr/>
-      </p:nvGrpSpPr>
-      <p:grpSpPr>
-        <a:xfrm>
-          <a:off x="0" y="0"/>
-          <a:ext cx="0" cy="0"/>
-          <a:chOff x="0" y="0"/>
-          <a:chExt cx="0" cy="0"/>
-        </a:xfrm>
-      </p:grpSpPr>
-      <p:sp>
-        <p:nvSpPr>
-          <p:cNvPr id="2" name="Title 1"/>
-          <p:cNvSpPr>
-            <a:spLocks noGrp="1"/>
-          </p:cNvSpPr>
-          <p:nvPr>
-            <p:ph type="title"/>
-          </p:nvPr>
-        </p:nvSpPr>
-        <p:spPr/>
-        <p:txBody>
-          <a:bodyPr/>
-          <a:lstStyle/>
-          <a:p>
-            <a:pPr lvl="0" marL="0" indent="0">
-              <a:buNone/>
-            </a:pPr>
-            <a:r>
-              <a:rPr/>
-              <a:t>Python</a:t>
-            </a:r>
-            <a:r>
-              <a:rPr/>
-              <a:t> </a:t>
-            </a:r>
-            <a:r>
-              <a:rPr/>
-              <a:t>Code</a:t>
-            </a:r>
-            <a:r>
-              <a:rPr/>
-              <a:t> </a:t>
-            </a:r>
-            <a:r>
-              <a:rPr/>
-              <a:t>Example</a:t>
-            </a:r>
-          </a:p>
-        </p:txBody>
-      </p:sp>
-      <p:sp>
-        <p:nvSpPr>
-          <p:cNvPr id="3" name="Content Placeholder 2"/>
-          <p:cNvSpPr>
-            <a:spLocks noGrp="1"/>
-          </p:cNvSpPr>
-          <p:nvPr>
-            <p:ph idx="1"/>
-          </p:nvPr>
-        </p:nvSpPr>
-        <p:spPr/>
-        <p:txBody>
-          <a:bodyPr/>
-          <a:lstStyle/>
-          <a:p>
-            <a:pPr lvl="0" marL="1270000" indent="0">
-              <a:buNone/>
-            </a:pPr>
-            <a:r>
-              <a:rPr sz="1800">
-                <a:latin typeface="Courier"/>
-              </a:rPr>
-              <a:t>import pandas as pd</a:t>
-            </a:r>
-            <a:br/>
-            <a:r>
-              <a:rPr sz="1800" i="1">
-                <a:solidFill>
-                  <a:srgbClr val="60A0B0"/>
-                </a:solidFill>
-                <a:latin typeface="Courier"/>
-              </a:rPr>
-              <a:t># Create the Python object from R</a:t>
-            </a:r>
-            <a:br/>
-            <a:r>
-              <a:rPr sz="1800">
-                <a:latin typeface="Courier"/>
-              </a:rPr>
-              <a:t>df </a:t>
-            </a:r>
-            <a:r>
-              <a:rPr sz="1800">
-                <a:solidFill>
-                  <a:srgbClr val="666666"/>
-                </a:solidFill>
-                <a:latin typeface="Courier"/>
-              </a:rPr>
-              <a:t>=</a:t>
-            </a:r>
-            <a:r>
-              <a:rPr sz="1800">
-                <a:latin typeface="Courier"/>
-              </a:rPr>
-              <a:t> r.cryptodata</a:t>
-            </a:r>
-            <a:br/>
-            <a:r>
-              <a:rPr sz="1800" i="1">
-                <a:solidFill>
-                  <a:srgbClr val="60A0B0"/>
-                </a:solidFill>
-                <a:latin typeface="Courier"/>
-              </a:rPr>
-              <a:t># Show the new Python dataframe</a:t>
-            </a:r>
-            <a:br/>
-            <a:r>
-              <a:rPr sz="1800">
-                <a:latin typeface="Courier"/>
-              </a:rPr>
-              <a:t>df</a:t>
-            </a:r>
-          </a:p>
-          <a:p>
-            <a:pPr lvl="0" marL="1270000" indent="0">
-              <a:buNone/>
-            </a:pPr>
-            <a:r>
-              <a:rPr sz="1800">
-                <a:latin typeface="Courier"/>
-              </a:rPr>
-              <a:t>##         pair symbol  ask_1_price       date_time_utc
-## 0     ETHUSD    ETH      582.881 2020-12-15 05:00:01
-## 1     BTCUSD    BTC    19173.700 2020-12-15 05:00:00
-## 2     ETHUSD    ETH      592.628 2020-12-15 04:00:01
-## 3     BTCUSD    BTC    19473.180 2020-12-15 04:00:00
-## 4     ETHUSD    ETH      593.576 2020-12-15 03:00:01
-## ...      ...    ...          ...                 ...
-## 5215  BTCUSD    BTC    11972.900 2020-08-10 06:03:50
-## 5216  BTCUSD    BTC    11985.890 2020-08-10 05:03:48
-## 5217  BTCUSD    BTC    11997.470 2020-08-10 04:32:55
-## 5218  BTCUSD    BTC    10686.880                 NaT
-## 5219  ETHUSD    ETH      357.844                 NaT
-## 
-## [5220 rows x 4 columns]</a:t>
-            </a:r>
-          </a:p>
-        </p:txBody>
-      </p:sp>
-    </p:spTree>
-  </p:cSld>
-</p:sld>
-</file>
-
 <file path=ppt/slides/slide5.xml><?xml version="1.0" encoding="utf-8"?>
 <p:sld xmlns:a="http://schemas.openxmlformats.org/drawingml/2006/main" xmlns:r="http://schemas.openxmlformats.org/officeDocument/2006/relationships" xmlns:p="http://schemas.openxmlformats.org/presentationml/2006/main">
   <p:cSld>
@@ -3598,7 +3556,7 @@
             </a:pPr>
             <a:r>
               <a:rPr/>
-              <a:t>One</a:t>
+              <a:t>Python</a:t>
             </a:r>
             <a:r>
               <a:rPr/>
@@ -3606,7 +3564,7 @@
             </a:r>
             <a:r>
               <a:rPr/>
-              <a:t>more</a:t>
+              <a:t>Code</a:t>
             </a:r>
             <a:r>
               <a:rPr/>
@@ -3614,15 +3572,7 @@
             </a:r>
             <a:r>
               <a:rPr/>
-              <a:t>Python</a:t>
-            </a:r>
-            <a:r>
-              <a:rPr/>
-              <a:t> </a:t>
-            </a:r>
-            <a:r>
-              <a:rPr/>
-              <a:t>example</a:t>
+              <a:t>Example</a:t>
             </a:r>
           </a:p>
         </p:txBody>
@@ -3642,68 +3592,34 @@
           <a:bodyPr/>
           <a:lstStyle/>
           <a:p>
-            <a:pPr lvl="0" marL="0" indent="0">
+            <a:pPr lvl="0" indent="0">
               <a:buNone/>
             </a:pPr>
             <a:r>
-              <a:rPr/>
-              <a:t>The code below creates a new column </a:t>
-            </a:r>
-            <a:r>
-              <a:rPr sz="1800">
+              <a:rPr>
                 <a:latin typeface="Courier"/>
               </a:rPr>
-              <a:t>price_percentile</a:t>
-            </a:r>
-            <a:r>
-              <a:rPr/>
-              <a:t> that specifies if the price for the row was in the upper or lower 50th percentile of prices (BTC should be upper and ETH lower):</a:t>
-            </a:r>
-          </a:p>
-          <a:p>
-            <a:pPr lvl="0" marL="1270000" indent="0">
-              <a:buNone/>
-            </a:pPr>
-            <a:r>
-              <a:rPr sz="1800">
-                <a:latin typeface="Courier"/>
-              </a:rPr>
-              <a:t>import numpy as np</a:t>
+              <a:t>import pandas as pd</a:t>
             </a:r>
             <a:br/>
             <a:r>
-              <a:rPr sz="1800" i="1">
+              <a:rPr i="1">
                 <a:solidFill>
                   <a:srgbClr val="60A0B0"/>
                 </a:solidFill>
                 <a:latin typeface="Courier"/>
               </a:rPr>
-              <a:t># Create a new column based on the ask_1_price value:</a:t>
+              <a:t># Create the Python object from R</a:t>
             </a:r>
             <a:br/>
             <a:r>
-              <a:rPr sz="1800">
+              <a:rPr>
                 <a:latin typeface="Courier"/>
               </a:rPr>
-              <a:t>df[</a:t>
-            </a:r>
-            <a:r>
-              <a:rPr sz="1800">
-                <a:solidFill>
-                  <a:srgbClr val="4070A0"/>
-                </a:solidFill>
-                <a:latin typeface="Courier"/>
-              </a:rPr>
-              <a:t>'price_percentile'</a:t>
-            </a:r>
-            <a:r>
-              <a:rPr sz="1800">
-                <a:latin typeface="Courier"/>
-              </a:rPr>
-              <a:t>] </a:t>
-            </a:r>
-            <a:r>
-              <a:rPr sz="1800">
+              <a:t>df </a:t>
+            </a:r>
+            <a:r>
+              <a:rPr>
                 <a:solidFill>
                   <a:srgbClr val="666666"/>
                 </a:solidFill>
@@ -3712,207 +3628,51 @@
               <a:t>=</a:t>
             </a:r>
             <a:r>
-              <a:rPr sz="1800">
+              <a:rPr>
                 <a:latin typeface="Courier"/>
               </a:rPr>
-              <a:t> np.where(df[</a:t>
-            </a:r>
-            <a:r>
-              <a:rPr sz="1800">
-                <a:solidFill>
-                  <a:srgbClr val="4070A0"/>
-                </a:solidFill>
-                <a:latin typeface="Courier"/>
-              </a:rPr>
-              <a:t>'ask_1_price'</a:t>
-            </a:r>
-            <a:r>
-              <a:rPr sz="1800">
-                <a:latin typeface="Courier"/>
-              </a:rPr>
-              <a:t>] </a:t>
-            </a:r>
-            <a:r>
-              <a:rPr sz="1800">
-                <a:solidFill>
-                  <a:srgbClr val="666666"/>
-                </a:solidFill>
-                <a:latin typeface="Courier"/>
-              </a:rPr>
-              <a:t>&gt;</a:t>
-            </a:r>
-            <a:r>
-              <a:rPr sz="1800">
-                <a:latin typeface="Courier"/>
-              </a:rPr>
-              <a:t> </a:t>
+              <a:t> r.cryptodata</a:t>
             </a:r>
             <a:br/>
             <a:r>
-              <a:rPr sz="1800">
-                <a:latin typeface="Courier"/>
-              </a:rPr>
-              <a:t>                                  np.percentile(df[</a:t>
-            </a:r>
-            <a:r>
-              <a:rPr sz="1800">
-                <a:solidFill>
-                  <a:srgbClr val="4070A0"/>
-                </a:solidFill>
-                <a:latin typeface="Courier"/>
-              </a:rPr>
-              <a:t>'ask_1_price'</a:t>
-            </a:r>
-            <a:r>
-              <a:rPr sz="1800">
-                <a:latin typeface="Courier"/>
-              </a:rPr>
-              <a:t>], </a:t>
-            </a:r>
-            <a:r>
-              <a:rPr sz="1800">
-                <a:solidFill>
-                  <a:srgbClr val="40A070"/>
-                </a:solidFill>
-                <a:latin typeface="Courier"/>
-              </a:rPr>
-              <a:t>50</a:t>
-            </a:r>
-            <a:r>
-              <a:rPr sz="1800">
-                <a:latin typeface="Courier"/>
-              </a:rPr>
-              <a:t>),</a:t>
-            </a:r>
-            <a:br/>
-            <a:r>
-              <a:rPr sz="1800">
-                <a:latin typeface="Courier"/>
-              </a:rPr>
-              <a:t>                            </a:t>
-            </a:r>
-            <a:r>
-              <a:rPr sz="1800">
-                <a:solidFill>
-                  <a:srgbClr val="4070A0"/>
-                </a:solidFill>
-                <a:latin typeface="Courier"/>
-              </a:rPr>
-              <a:t>'upper 50th percentile of prices'</a:t>
-            </a:r>
-            <a:r>
-              <a:rPr sz="1800">
-                <a:latin typeface="Courier"/>
-              </a:rPr>
-              <a:t>, </a:t>
-            </a:r>
-            <a:br/>
-            <a:r>
-              <a:rPr sz="1800">
-                <a:latin typeface="Courier"/>
-              </a:rPr>
-              <a:t>                            </a:t>
-            </a:r>
-            <a:r>
-              <a:rPr sz="1800">
-                <a:solidFill>
-                  <a:srgbClr val="4070A0"/>
-                </a:solidFill>
-                <a:latin typeface="Courier"/>
-              </a:rPr>
-              <a:t>'lower 50th percentile of prices'</a:t>
-            </a:r>
-            <a:r>
-              <a:rPr sz="1800">
-                <a:latin typeface="Courier"/>
-              </a:rPr>
-              <a:t>)</a:t>
-            </a:r>
-            <a:br/>
-            <a:r>
-              <a:rPr sz="1800" i="1">
+              <a:rPr i="1">
                 <a:solidFill>
                   <a:srgbClr val="60A0B0"/>
                 </a:solidFill>
                 <a:latin typeface="Courier"/>
               </a:rPr>
-              <a:t># Show modified dataframe:</a:t>
+              <a:t># Show the new Python dataframe</a:t>
             </a:r>
             <a:br/>
             <a:r>
-              <a:rPr sz="1800">
+              <a:rPr>
                 <a:latin typeface="Courier"/>
               </a:rPr>
-              <a:t>df[[</a:t>
-            </a:r>
-            <a:r>
-              <a:rPr sz="1800">
-                <a:solidFill>
-                  <a:srgbClr val="4070A0"/>
-                </a:solidFill>
+              <a:t>df</a:t>
+            </a:r>
+          </a:p>
+          <a:p>
+            <a:pPr lvl="0" indent="0">
+              <a:buNone/>
+            </a:pPr>
+            <a:r>
+              <a:rPr>
                 <a:latin typeface="Courier"/>
               </a:rPr>
-              <a:t>'symbol'</a:t>
-            </a:r>
-            <a:r>
-              <a:rPr sz="1800">
-                <a:latin typeface="Courier"/>
-              </a:rPr>
-              <a:t>, </a:t>
-            </a:r>
-            <a:r>
-              <a:rPr sz="1800">
-                <a:solidFill>
-                  <a:srgbClr val="4070A0"/>
-                </a:solidFill>
-                <a:latin typeface="Courier"/>
-              </a:rPr>
-              <a:t>'ask_1_price'</a:t>
-            </a:r>
-            <a:r>
-              <a:rPr sz="1800">
-                <a:latin typeface="Courier"/>
-              </a:rPr>
-              <a:t>, </a:t>
-            </a:r>
-            <a:r>
-              <a:rPr sz="1800">
-                <a:solidFill>
-                  <a:srgbClr val="4070A0"/>
-                </a:solidFill>
-                <a:latin typeface="Courier"/>
-              </a:rPr>
-              <a:t>'price_percentile'</a:t>
-            </a:r>
-            <a:r>
-              <a:rPr sz="1800">
-                <a:latin typeface="Courier"/>
-              </a:rPr>
-              <a:t>]]</a:t>
-            </a:r>
-          </a:p>
-          <a:p>
-            <a:pPr lvl="0" marL="1270000" indent="0">
-              <a:buNone/>
-            </a:pPr>
-            <a:r>
-              <a:rPr sz="1800">
-                <a:latin typeface="Courier"/>
-              </a:rPr>
-              <a:t>##      symbol  ask_1_price                 price_percentile
-## 0       ETH      582.881  lower 50th percentile of prices
-## 1       BTC    19173.700  upper 50th percentile of prices
-## 2       ETH      592.628  lower 50th percentile of prices
-## 3       BTC    19473.180  upper 50th percentile of prices
-## 4       ETH      593.576  lower 50th percentile of prices
-## ...     ...          ...                              ...
-## 5215    BTC    11972.900  upper 50th percentile of prices
-## 5216    BTC    11985.890  upper 50th percentile of prices
-## 5217    BTC    11997.470  upper 50th percentile of prices
-## 5218    BTC    10686.880  upper 50th percentile of prices
-## 5219    ETH      357.844  lower 50th percentile of prices
+              <a:t>##         pair symbol  ask_1_price       date_time_utc
+## 0     ETHUSD    ETH      586.354 2020-12-14 22:00:01
+## 1     BTCUSD    BTC    19195.290 2020-12-14 22:00:00
+## 2     BTCUSD    BTC    19211.840 2020-12-14 21:00:01
+## 3     ETHUSD    ETH      587.396 2020-12-14 21:00:01
+## 4     BTCUSD    BTC    19176.520 2020-12-14 20:00:01
+## ...      ...    ...          ...                 ...
+## 5201  BTCUSD    BTC    11972.900 2020-08-10 06:03:50
+## 5202  BTCUSD    BTC    11985.890 2020-08-10 05:03:48
+## 5203  BTCUSD    BTC    11997.470 2020-08-10 04:32:55
+## 5204  BTCUSD    BTC    10686.880                 NaT
+## 5205  ETHUSD    ETH      357.844                 NaT
 ## 
-## [5220 rows x 3 columns]</a:t>
+## [5206 rows x 4 columns]</a:t>
             </a:r>
           </a:p>
         </p:txBody>
@@ -3958,85 +3718,322 @@
               <a:buNone/>
             </a:pPr>
             <a:r>
+              <a:rPr/>
+              <a:t>One</a:t>
+            </a:r>
+            <a:r>
+              <a:rPr/>
+              <a:t> </a:t>
+            </a:r>
+            <a:r>
+              <a:rPr/>
+              <a:t>more</a:t>
+            </a:r>
+            <a:r>
+              <a:rPr/>
+              <a:t> </a:t>
+            </a:r>
+            <a:r>
+              <a:rPr/>
+              <a:t>Python</a:t>
+            </a:r>
+            <a:r>
+              <a:rPr/>
+              <a:t> </a:t>
+            </a:r>
+            <a:r>
+              <a:rPr/>
+              <a:t>example</a:t>
+            </a:r>
+          </a:p>
+        </p:txBody>
+      </p:sp>
+      <p:sp>
+        <p:nvSpPr>
+          <p:cNvPr id="3" name="Content Placeholder 2"/>
+          <p:cNvSpPr>
+            <a:spLocks noGrp="1"/>
+          </p:cNvSpPr>
+          <p:nvPr>
+            <p:ph idx="1"/>
+          </p:nvPr>
+        </p:nvSpPr>
+        <p:spPr/>
+        <p:txBody>
+          <a:bodyPr/>
+          <a:lstStyle/>
+          <a:p>
+            <a:pPr lvl="0" marL="0" indent="0">
+              <a:buNone/>
+            </a:pPr>
+            <a:r>
+              <a:rPr/>
+              <a:t>The code below creates a new column </a:t>
+            </a:r>
+            <a:r>
               <a:rPr>
-                <a:hlinkClick r:id="rId2"/>
+                <a:latin typeface="Courier"/>
               </a:rPr>
-              <a:t>Back</a:t>
-            </a:r>
+              <a:t>price_percentile</a:t>
+            </a:r>
+            <a:r>
+              <a:rPr/>
+              <a:t> that specifies if the price for the row was in the upper or lower 50th percentile of prices (BTC should be upper and ETH lower):</a:t>
+            </a:r>
+          </a:p>
+          <a:p>
+            <a:pPr lvl="0" indent="0">
+              <a:buNone/>
+            </a:pPr>
             <a:r>
               <a:rPr>
-                <a:hlinkClick r:id="rId3"/>
+                <a:latin typeface="Courier"/>
               </a:rPr>
-              <a:t> </a:t>
-            </a:r>
-            <a:r>
-              <a:rPr>
-                <a:hlinkClick r:id="rId4"/>
-              </a:rPr>
-              <a:t>to</a:t>
-            </a:r>
-            <a:r>
-              <a:rPr>
-                <a:hlinkClick r:id="rId5"/>
-              </a:rPr>
-              <a:t> </a:t>
-            </a:r>
-            <a:r>
-              <a:rPr>
-                <a:hlinkClick r:id="rId6"/>
-              </a:rPr>
-              <a:t>Gallery</a:t>
-            </a:r>
-          </a:p>
-        </p:txBody>
-      </p:sp>
-      <p:sp>
-        <p:nvSpPr>
-          <p:cNvPr id="3" name="Content Placeholder 2"/>
-          <p:cNvSpPr>
-            <a:spLocks noGrp="1"/>
-          </p:cNvSpPr>
-          <p:nvPr>
-            <p:ph idx="1"/>
-          </p:nvPr>
-        </p:nvSpPr>
-        <p:spPr/>
-        <p:txBody>
-          <a:bodyPr/>
-          <a:lstStyle/>
-          <a:p>
-            <a:pPr lvl="0" marL="1270000" indent="0">
-              <a:buNone/>
-            </a:pPr>
-            <a:r>
-              <a:rPr sz="1800" b="1">
+              <a:t>import numpy as np</a:t>
+            </a:r>
+            <a:br/>
+            <a:r>
+              <a:rPr i="1">
                 <a:solidFill>
-                  <a:srgbClr val="007020"/>
+                  <a:srgbClr val="60A0B0"/>
                 </a:solidFill>
                 <a:latin typeface="Courier"/>
               </a:rPr>
-              <a:t>include_url</a:t>
-            </a:r>
-            <a:r>
-              <a:rPr sz="1800">
+              <a:t># Create a new column based on the ask_1_price value:</a:t>
+            </a:r>
+            <a:br/>
+            <a:r>
+              <a:rPr>
                 <a:latin typeface="Courier"/>
               </a:rPr>
-              <a:t>(</a:t>
-            </a:r>
-            <a:r>
-              <a:rPr sz="1800">
+              <a:t>df[</a:t>
+            </a:r>
+            <a:r>
+              <a:rPr>
                 <a:solidFill>
                   <a:srgbClr val="4070A0"/>
                 </a:solidFill>
                 <a:latin typeface="Courier"/>
               </a:rPr>
-              <a:t>"https://r-markdown-gallery.org"</a:t>
-            </a:r>
-            <a:r>
-              <a:rPr sz="1800">
+              <a:t>'price_percentile'</a:t>
+            </a:r>
+            <a:r>
+              <a:rPr>
+                <a:latin typeface="Courier"/>
+              </a:rPr>
+              <a:t>] </a:t>
+            </a:r>
+            <a:r>
+              <a:rPr>
+                <a:solidFill>
+                  <a:srgbClr val="666666"/>
+                </a:solidFill>
+                <a:latin typeface="Courier"/>
+              </a:rPr>
+              <a:t>=</a:t>
+            </a:r>
+            <a:r>
+              <a:rPr>
+                <a:latin typeface="Courier"/>
+              </a:rPr>
+              <a:t> np.where(df[</a:t>
+            </a:r>
+            <a:r>
+              <a:rPr>
+                <a:solidFill>
+                  <a:srgbClr val="4070A0"/>
+                </a:solidFill>
+                <a:latin typeface="Courier"/>
+              </a:rPr>
+              <a:t>'ask_1_price'</a:t>
+            </a:r>
+            <a:r>
+              <a:rPr>
+                <a:latin typeface="Courier"/>
+              </a:rPr>
+              <a:t>] </a:t>
+            </a:r>
+            <a:r>
+              <a:rPr>
+                <a:solidFill>
+                  <a:srgbClr val="666666"/>
+                </a:solidFill>
+                <a:latin typeface="Courier"/>
+              </a:rPr>
+              <a:t>&gt;</a:t>
+            </a:r>
+            <a:r>
+              <a:rPr>
+                <a:latin typeface="Courier"/>
+              </a:rPr>
+              <a:t> </a:t>
+            </a:r>
+            <a:br/>
+            <a:r>
+              <a:rPr>
+                <a:latin typeface="Courier"/>
+              </a:rPr>
+              <a:t>                                  np.percentile(df[</a:t>
+            </a:r>
+            <a:r>
+              <a:rPr>
+                <a:solidFill>
+                  <a:srgbClr val="4070A0"/>
+                </a:solidFill>
+                <a:latin typeface="Courier"/>
+              </a:rPr>
+              <a:t>'ask_1_price'</a:t>
+            </a:r>
+            <a:r>
+              <a:rPr>
+                <a:latin typeface="Courier"/>
+              </a:rPr>
+              <a:t>], </a:t>
+            </a:r>
+            <a:r>
+              <a:rPr>
+                <a:solidFill>
+                  <a:srgbClr val="40A070"/>
+                </a:solidFill>
+                <a:latin typeface="Courier"/>
+              </a:rPr>
+              <a:t>50</a:t>
+            </a:r>
+            <a:r>
+              <a:rPr>
+                <a:latin typeface="Courier"/>
+              </a:rPr>
+              <a:t>),</a:t>
+            </a:r>
+            <a:br/>
+            <a:r>
+              <a:rPr>
+                <a:latin typeface="Courier"/>
+              </a:rPr>
+              <a:t>                            </a:t>
+            </a:r>
+            <a:r>
+              <a:rPr>
+                <a:solidFill>
+                  <a:srgbClr val="4070A0"/>
+                </a:solidFill>
+                <a:latin typeface="Courier"/>
+              </a:rPr>
+              <a:t>'upper 50th percentile of prices'</a:t>
+            </a:r>
+            <a:r>
+              <a:rPr>
+                <a:latin typeface="Courier"/>
+              </a:rPr>
+              <a:t>, </a:t>
+            </a:r>
+            <a:br/>
+            <a:r>
+              <a:rPr>
+                <a:latin typeface="Courier"/>
+              </a:rPr>
+              <a:t>                            </a:t>
+            </a:r>
+            <a:r>
+              <a:rPr>
+                <a:solidFill>
+                  <a:srgbClr val="4070A0"/>
+                </a:solidFill>
+                <a:latin typeface="Courier"/>
+              </a:rPr>
+              <a:t>'lower 50th percentile of prices'</a:t>
+            </a:r>
+            <a:r>
+              <a:rPr>
                 <a:latin typeface="Courier"/>
               </a:rPr>
               <a:t>)</a:t>
+            </a:r>
+            <a:br/>
+            <a:r>
+              <a:rPr i="1">
+                <a:solidFill>
+                  <a:srgbClr val="60A0B0"/>
+                </a:solidFill>
+                <a:latin typeface="Courier"/>
+              </a:rPr>
+              <a:t># Show modified dataframe:</a:t>
+            </a:r>
+            <a:br/>
+            <a:r>
+              <a:rPr>
+                <a:latin typeface="Courier"/>
+              </a:rPr>
+              <a:t>df[[</a:t>
+            </a:r>
+            <a:r>
+              <a:rPr>
+                <a:solidFill>
+                  <a:srgbClr val="4070A0"/>
+                </a:solidFill>
+                <a:latin typeface="Courier"/>
+              </a:rPr>
+              <a:t>'symbol'</a:t>
+            </a:r>
+            <a:r>
+              <a:rPr>
+                <a:latin typeface="Courier"/>
+              </a:rPr>
+              <a:t>, </a:t>
+            </a:r>
+            <a:r>
+              <a:rPr>
+                <a:solidFill>
+                  <a:srgbClr val="4070A0"/>
+                </a:solidFill>
+                <a:latin typeface="Courier"/>
+              </a:rPr>
+              <a:t>'ask_1_price'</a:t>
+            </a:r>
+            <a:r>
+              <a:rPr>
+                <a:latin typeface="Courier"/>
+              </a:rPr>
+              <a:t>, </a:t>
+            </a:r>
+            <a:r>
+              <a:rPr>
+                <a:solidFill>
+                  <a:srgbClr val="4070A0"/>
+                </a:solidFill>
+                <a:latin typeface="Courier"/>
+              </a:rPr>
+              <a:t>'price_percentile'</a:t>
+            </a:r>
+            <a:r>
+              <a:rPr>
+                <a:latin typeface="Courier"/>
+              </a:rPr>
+              <a:t>]]</a:t>
+            </a:r>
+          </a:p>
+          <a:p>
+            <a:pPr lvl="0" indent="0">
+              <a:buNone/>
+            </a:pPr>
+            <a:r>
+              <a:rPr>
+                <a:latin typeface="Courier"/>
+              </a:rPr>
+              <a:t>##      symbol  ask_1_price                 price_percentile
+## 0       ETH      586.354  lower 50th percentile of prices
+## 1       BTC    19195.290  upper 50th percentile of prices
+## 2       BTC    19211.840  upper 50th percentile of prices
+## 3       ETH      587.396  lower 50th percentile of prices
+## 4       BTC    19176.520  upper 50th percentile of prices
+## ...     ...          ...                              ...
+## 5201    BTC    11972.900  upper 50th percentile of prices
+## 5202    BTC    11985.890  upper 50th percentile of prices
+## 5203    BTC    11997.470  upper 50th percentile of prices
+## 5204    BTC    10686.880  upper 50th percentile of prices
+## 5205    ETH      357.844  lower 50th percentile of prices
+## 
+## [5206 rows x 3 columns]</a:t>
             </a:r>
           </a:p>
         </p:txBody>

</xml_diff>